<commit_message>
Chore/Added more structure to ppt
</commit_message>
<xml_diff>
--- a/Divergence_Pitch_04-09.pptx
+++ b/Divergence_Pitch_04-09.pptx
@@ -6,9 +6,11 @@
   </p:sldMasterIdLst>
   <p:sldIdLst>
     <p:sldId id="256" r:id="rId2"/>
-    <p:sldId id="257" r:id="rId3"/>
-    <p:sldId id="259" r:id="rId4"/>
-    <p:sldId id="258" r:id="rId5"/>
+    <p:sldId id="260" r:id="rId3"/>
+    <p:sldId id="257" r:id="rId4"/>
+    <p:sldId id="259" r:id="rId5"/>
+    <p:sldId id="262" r:id="rId6"/>
+    <p:sldId id="261" r:id="rId7"/>
   </p:sldIdLst>
   <p:sldSz cx="12192000" cy="6858000"/>
   <p:notesSz cx="6858000" cy="9144000"/>
@@ -107,6 +109,11 @@
       </a:defRPr>
     </a:lvl9pPr>
   </p:defaultTextStyle>
+  <p:extLst>
+    <p:ext uri="{EFAFB233-063F-42B5-8137-9DF3F51BA10A}">
+      <p15:sldGuideLst xmlns:p15="http://schemas.microsoft.com/office/powerpoint/2012/main"/>
+    </p:ext>
+  </p:extLst>
 </p:presentation>
 </file>
 
@@ -259,7 +266,7 @@
           <a:p>
             <a:fld id="{2EE0E774-AE77-4F09-8D6C-429950E9349F}" type="datetimeFigureOut">
               <a:rPr lang="en-BE" smtClean="0"/>
-              <a:t>31/08/2024</a:t>
+              <a:t>02/09/2024</a:t>
             </a:fld>
             <a:endParaRPr lang="en-BE"/>
           </a:p>
@@ -459,7 +466,7 @@
           <a:p>
             <a:fld id="{2EE0E774-AE77-4F09-8D6C-429950E9349F}" type="datetimeFigureOut">
               <a:rPr lang="en-BE" smtClean="0"/>
-              <a:t>31/08/2024</a:t>
+              <a:t>02/09/2024</a:t>
             </a:fld>
             <a:endParaRPr lang="en-BE"/>
           </a:p>
@@ -669,7 +676,7 @@
           <a:p>
             <a:fld id="{2EE0E774-AE77-4F09-8D6C-429950E9349F}" type="datetimeFigureOut">
               <a:rPr lang="en-BE" smtClean="0"/>
-              <a:t>31/08/2024</a:t>
+              <a:t>02/09/2024</a:t>
             </a:fld>
             <a:endParaRPr lang="en-BE"/>
           </a:p>
@@ -869,7 +876,7 @@
           <a:p>
             <a:fld id="{2EE0E774-AE77-4F09-8D6C-429950E9349F}" type="datetimeFigureOut">
               <a:rPr lang="en-BE" smtClean="0"/>
-              <a:t>31/08/2024</a:t>
+              <a:t>02/09/2024</a:t>
             </a:fld>
             <a:endParaRPr lang="en-BE"/>
           </a:p>
@@ -1145,7 +1152,7 @@
           <a:p>
             <a:fld id="{2EE0E774-AE77-4F09-8D6C-429950E9349F}" type="datetimeFigureOut">
               <a:rPr lang="en-BE" smtClean="0"/>
-              <a:t>31/08/2024</a:t>
+              <a:t>02/09/2024</a:t>
             </a:fld>
             <a:endParaRPr lang="en-BE"/>
           </a:p>
@@ -1413,7 +1420,7 @@
           <a:p>
             <a:fld id="{2EE0E774-AE77-4F09-8D6C-429950E9349F}" type="datetimeFigureOut">
               <a:rPr lang="en-BE" smtClean="0"/>
-              <a:t>31/08/2024</a:t>
+              <a:t>02/09/2024</a:t>
             </a:fld>
             <a:endParaRPr lang="en-BE"/>
           </a:p>
@@ -1828,7 +1835,7 @@
           <a:p>
             <a:fld id="{2EE0E774-AE77-4F09-8D6C-429950E9349F}" type="datetimeFigureOut">
               <a:rPr lang="en-BE" smtClean="0"/>
-              <a:t>31/08/2024</a:t>
+              <a:t>02/09/2024</a:t>
             </a:fld>
             <a:endParaRPr lang="en-BE"/>
           </a:p>
@@ -1970,7 +1977,7 @@
           <a:p>
             <a:fld id="{2EE0E774-AE77-4F09-8D6C-429950E9349F}" type="datetimeFigureOut">
               <a:rPr lang="en-BE" smtClean="0"/>
-              <a:t>31/08/2024</a:t>
+              <a:t>02/09/2024</a:t>
             </a:fld>
             <a:endParaRPr lang="en-BE"/>
           </a:p>
@@ -2083,7 +2090,7 @@
           <a:p>
             <a:fld id="{2EE0E774-AE77-4F09-8D6C-429950E9349F}" type="datetimeFigureOut">
               <a:rPr lang="en-BE" smtClean="0"/>
-              <a:t>31/08/2024</a:t>
+              <a:t>02/09/2024</a:t>
             </a:fld>
             <a:endParaRPr lang="en-BE"/>
           </a:p>
@@ -2396,7 +2403,7 @@
           <a:p>
             <a:fld id="{2EE0E774-AE77-4F09-8D6C-429950E9349F}" type="datetimeFigureOut">
               <a:rPr lang="en-BE" smtClean="0"/>
-              <a:t>31/08/2024</a:t>
+              <a:t>02/09/2024</a:t>
             </a:fld>
             <a:endParaRPr lang="en-BE"/>
           </a:p>
@@ -2685,7 +2692,7 @@
           <a:p>
             <a:fld id="{2EE0E774-AE77-4F09-8D6C-429950E9349F}" type="datetimeFigureOut">
               <a:rPr lang="en-BE" smtClean="0"/>
-              <a:t>31/08/2024</a:t>
+              <a:t>02/09/2024</a:t>
             </a:fld>
             <a:endParaRPr lang="en-BE"/>
           </a:p>
@@ -2762,9 +2769,27 @@
 <p:sldMaster xmlns:a="http://schemas.openxmlformats.org/drawingml/2006/main" xmlns:r="http://schemas.openxmlformats.org/officeDocument/2006/relationships" xmlns:p="http://schemas.openxmlformats.org/presentationml/2006/main">
   <p:cSld>
     <p:bg>
-      <p:bgRef idx="1001">
-        <a:schemeClr val="bg1"/>
-      </p:bgRef>
+      <p:bgPr>
+        <a:gradFill flip="none" rotWithShape="1">
+          <a:gsLst>
+            <a:gs pos="0">
+              <a:schemeClr val="tx1">
+                <a:lumMod val="50000"/>
+                <a:lumOff val="50000"/>
+              </a:schemeClr>
+            </a:gs>
+            <a:gs pos="100000">
+              <a:schemeClr val="tx1">
+                <a:lumMod val="65000"/>
+                <a:lumOff val="35000"/>
+              </a:schemeClr>
+            </a:gs>
+          </a:gsLst>
+          <a:lin ang="5400000" scaled="1"/>
+          <a:tileRect/>
+        </a:gradFill>
+        <a:effectLst/>
+      </p:bgPr>
     </p:bg>
     <p:spTree>
       <p:nvGrpSpPr>
@@ -2928,7 +2953,7 @@
           <a:p>
             <a:fld id="{2EE0E774-AE77-4F09-8D6C-429950E9349F}" type="datetimeFigureOut">
               <a:rPr lang="en-BE" smtClean="0"/>
-              <a:t>31/08/2024</a:t>
+              <a:t>02/09/2024</a:t>
             </a:fld>
             <a:endParaRPr lang="en-BE"/>
           </a:p>
@@ -3331,28 +3356,6 @@
 <file path=ppt/slides/slide1.xml><?xml version="1.0" encoding="utf-8"?>
 <p:sld xmlns:a="http://schemas.openxmlformats.org/drawingml/2006/main" xmlns:r="http://schemas.openxmlformats.org/officeDocument/2006/relationships" xmlns:p="http://schemas.openxmlformats.org/presentationml/2006/main">
   <p:cSld>
-    <p:bg>
-      <p:bgPr>
-        <a:gradFill>
-          <a:gsLst>
-            <a:gs pos="0">
-              <a:schemeClr val="tx1">
-                <a:lumMod val="50000"/>
-                <a:lumOff val="50000"/>
-              </a:schemeClr>
-            </a:gs>
-            <a:gs pos="100000">
-              <a:schemeClr val="tx1">
-                <a:lumMod val="65000"/>
-                <a:lumOff val="35000"/>
-              </a:schemeClr>
-            </a:gs>
-          </a:gsLst>
-          <a:lin ang="5400000" scaled="1"/>
-        </a:gradFill>
-        <a:effectLst/>
-      </p:bgPr>
-    </p:bg>
     <p:spTree>
       <p:nvGrpSpPr>
         <p:cNvPr id="1" name=""/>
@@ -3529,28 +3532,6 @@
 <file path=ppt/slides/slide2.xml><?xml version="1.0" encoding="utf-8"?>
 <p:sld xmlns:a="http://schemas.openxmlformats.org/drawingml/2006/main" xmlns:r="http://schemas.openxmlformats.org/officeDocument/2006/relationships" xmlns:p="http://schemas.openxmlformats.org/presentationml/2006/main">
   <p:cSld>
-    <p:bg>
-      <p:bgPr>
-        <a:gradFill>
-          <a:gsLst>
-            <a:gs pos="0">
-              <a:schemeClr val="tx1">
-                <a:lumMod val="50000"/>
-                <a:lumOff val="50000"/>
-              </a:schemeClr>
-            </a:gs>
-            <a:gs pos="100000">
-              <a:schemeClr val="tx1">
-                <a:lumMod val="65000"/>
-                <a:lumOff val="35000"/>
-              </a:schemeClr>
-            </a:gs>
-          </a:gsLst>
-          <a:lin ang="5400000" scaled="1"/>
-        </a:gradFill>
-        <a:effectLst/>
-      </p:bgPr>
-    </p:bg>
     <p:spTree>
       <p:nvGrpSpPr>
         <p:cNvPr id="1" name=""/>
@@ -3625,6 +3606,11 @@
           <a:bodyPr/>
           <a:lstStyle/>
           <a:p>
+            <a:pPr>
+              <a:lnSpc>
+                <a:spcPct val="150000"/>
+              </a:lnSpc>
+            </a:pPr>
             <a:r>
               <a:rPr lang="en-GB" dirty="0">
                 <a:solidFill>
@@ -3635,11 +3621,15 @@
                 <a:latin typeface="Arial" panose="020B0604020202020204" pitchFamily="34" charset="0"/>
                 <a:cs typeface="Arial" panose="020B0604020202020204" pitchFamily="34" charset="0"/>
               </a:rPr>
-              <a:t>Round Based Survival</a:t>
-            </a:r>
-          </a:p>
-          <a:p>
-            <a:pPr lvl="1"/>
+              <a:t>FPS Round based survival</a:t>
+            </a:r>
+          </a:p>
+          <a:p>
+            <a:pPr>
+              <a:lnSpc>
+                <a:spcPct val="150000"/>
+              </a:lnSpc>
+            </a:pPr>
             <a:r>
               <a:rPr lang="en-GB" dirty="0">
                 <a:solidFill>
@@ -3650,11 +3640,15 @@
                 <a:latin typeface="Arial" panose="020B0604020202020204" pitchFamily="34" charset="0"/>
                 <a:cs typeface="Arial" panose="020B0604020202020204" pitchFamily="34" charset="0"/>
               </a:rPr>
-              <a:t>Call Of Duty</a:t>
-            </a:r>
-          </a:p>
-          <a:p>
-            <a:pPr lvl="1"/>
+              <a:t>Limb replacement</a:t>
+            </a:r>
+          </a:p>
+          <a:p>
+            <a:pPr lvl="1">
+              <a:lnSpc>
+                <a:spcPct val="100000"/>
+              </a:lnSpc>
+            </a:pPr>
             <a:r>
               <a:rPr lang="en-GB" dirty="0">
                 <a:solidFill>
@@ -3665,24 +3659,53 @@
                 <a:latin typeface="Arial" panose="020B0604020202020204" pitchFamily="34" charset="0"/>
                 <a:cs typeface="Arial" panose="020B0604020202020204" pitchFamily="34" charset="0"/>
               </a:rPr>
-              <a:t>Doom</a:t>
-            </a:r>
-            <a:endParaRPr lang="en-BE" dirty="0">
-              <a:solidFill>
-                <a:schemeClr val="bg2">
-                  <a:lumMod val="90000"/>
-                </a:schemeClr>
-              </a:solidFill>
-              <a:latin typeface="Arial" panose="020B0604020202020204" pitchFamily="34" charset="0"/>
-              <a:cs typeface="Arial" panose="020B0604020202020204" pitchFamily="34" charset="0"/>
-            </a:endParaRPr>
+              <a:t>Abilities and weapons</a:t>
+            </a:r>
+          </a:p>
+          <a:p>
+            <a:pPr>
+              <a:lnSpc>
+                <a:spcPct val="150000"/>
+              </a:lnSpc>
+            </a:pPr>
+            <a:r>
+              <a:rPr lang="en-GB" dirty="0">
+                <a:solidFill>
+                  <a:schemeClr val="bg2">
+                    <a:lumMod val="90000"/>
+                  </a:schemeClr>
+                </a:solidFill>
+                <a:latin typeface="Arial" panose="020B0604020202020204" pitchFamily="34" charset="0"/>
+                <a:cs typeface="Arial" panose="020B0604020202020204" pitchFamily="34" charset="0"/>
+              </a:rPr>
+              <a:t>Human</a:t>
+            </a:r>
+          </a:p>
+          <a:p>
+            <a:pPr>
+              <a:lnSpc>
+                <a:spcPct val="150000"/>
+              </a:lnSpc>
+            </a:pPr>
+            <a:r>
+              <a:rPr lang="en-GB" dirty="0">
+                <a:solidFill>
+                  <a:schemeClr val="bg2">
+                    <a:lumMod val="90000"/>
+                  </a:schemeClr>
+                </a:solidFill>
+                <a:latin typeface="Arial" panose="020B0604020202020204" pitchFamily="34" charset="0"/>
+                <a:cs typeface="Arial" panose="020B0604020202020204" pitchFamily="34" charset="0"/>
+              </a:rPr>
+              <a:t>Dynamic map</a:t>
+            </a:r>
           </a:p>
         </p:txBody>
       </p:sp>
     </p:spTree>
     <p:extLst>
       <p:ext uri="{BB962C8B-B14F-4D97-AF65-F5344CB8AC3E}">
-        <p14:creationId xmlns:p14="http://schemas.microsoft.com/office/powerpoint/2010/main" val="2620836187"/>
+        <p14:creationId xmlns:p14="http://schemas.microsoft.com/office/powerpoint/2010/main" val="2476028739"/>
       </p:ext>
     </p:extLst>
   </p:cSld>
@@ -3695,28 +3718,6 @@
 <file path=ppt/slides/slide3.xml><?xml version="1.0" encoding="utf-8"?>
 <p:sld xmlns:a="http://schemas.openxmlformats.org/drawingml/2006/main" xmlns:r="http://schemas.openxmlformats.org/officeDocument/2006/relationships" xmlns:p="http://schemas.openxmlformats.org/presentationml/2006/main">
   <p:cSld>
-    <p:bg>
-      <p:bgPr>
-        <a:gradFill>
-          <a:gsLst>
-            <a:gs pos="0">
-              <a:schemeClr val="tx1">
-                <a:lumMod val="50000"/>
-                <a:lumOff val="50000"/>
-              </a:schemeClr>
-            </a:gs>
-            <a:gs pos="100000">
-              <a:schemeClr val="tx1">
-                <a:lumMod val="65000"/>
-                <a:lumOff val="35000"/>
-              </a:schemeClr>
-            </a:gs>
-          </a:gsLst>
-          <a:lin ang="5400000" scaled="1"/>
-        </a:gradFill>
-        <a:effectLst/>
-      </p:bgPr>
-    </p:bg>
     <p:spTree>
       <p:nvGrpSpPr>
         <p:cNvPr id="1" name=""/>
@@ -3759,7 +3760,7 @@
                 </a:solidFill>
                 <a:latin typeface="Arial Black" panose="020B0A04020102020204" pitchFamily="34" charset="0"/>
               </a:rPr>
-              <a:t>Art Style</a:t>
+              <a:t>Inspiration</a:t>
             </a:r>
             <a:endParaRPr lang="en-BE" dirty="0">
               <a:solidFill>
@@ -3791,25 +3792,74 @@
           <a:bodyPr/>
           <a:lstStyle/>
           <a:p>
-            <a:r>
-              <a:rPr lang="en-GB" dirty="0">
-                <a:solidFill>
-                  <a:schemeClr val="bg2">
-                    <a:lumMod val="90000"/>
-                  </a:schemeClr>
-                </a:solidFill>
-                <a:latin typeface="Arial" panose="020B0604020202020204" pitchFamily="34" charset="0"/>
-                <a:cs typeface="Arial" panose="020B0604020202020204" pitchFamily="34" charset="0"/>
-              </a:rPr>
-              <a:t>Cartoonish</a:t>
-            </a:r>
-          </a:p>
-        </p:txBody>
-      </p:sp>
+            <a:pPr>
+              <a:lnSpc>
+                <a:spcPct val="150000"/>
+              </a:lnSpc>
+            </a:pPr>
+            <a:endParaRPr lang="en-GB" dirty="0">
+              <a:solidFill>
+                <a:schemeClr val="bg2">
+                  <a:lumMod val="90000"/>
+                </a:schemeClr>
+              </a:solidFill>
+              <a:latin typeface="Arial" panose="020B0604020202020204" pitchFamily="34" charset="0"/>
+              <a:cs typeface="Arial" panose="020B0604020202020204" pitchFamily="34" charset="0"/>
+            </a:endParaRPr>
+          </a:p>
+          <a:p>
+            <a:endParaRPr lang="en-GB" dirty="0">
+              <a:solidFill>
+                <a:schemeClr val="bg2">
+                  <a:lumMod val="90000"/>
+                </a:schemeClr>
+              </a:solidFill>
+              <a:latin typeface="Arial" panose="020B0604020202020204" pitchFamily="34" charset="0"/>
+              <a:cs typeface="Arial" panose="020B0604020202020204" pitchFamily="34" charset="0"/>
+            </a:endParaRPr>
+          </a:p>
+        </p:txBody>
+      </p:sp>
+      <p:pic>
+        <p:nvPicPr>
+          <p:cNvPr id="5" name="Picture 4" descr="A person with a mustache and a mustache and glowing eyes&#10;&#10;Description automatically generated">
+            <a:extLst>
+              <a:ext uri="{FF2B5EF4-FFF2-40B4-BE49-F238E27FC236}">
+                <a16:creationId xmlns:a16="http://schemas.microsoft.com/office/drawing/2014/main" id="{62EF607B-4281-73C7-8067-3CC308A5D2F1}"/>
+              </a:ext>
+            </a:extLst>
+          </p:cNvPr>
+          <p:cNvPicPr>
+            <a:picLocks noChangeAspect="1"/>
+          </p:cNvPicPr>
+          <p:nvPr/>
+        </p:nvPicPr>
+        <p:blipFill>
+          <a:blip r:embed="rId2">
+            <a:extLst>
+              <a:ext uri="{28A0092B-C50C-407E-A947-70E740481C1C}">
+                <a14:useLocalDpi xmlns:a14="http://schemas.microsoft.com/office/drawing/2010/main" val="0"/>
+              </a:ext>
+            </a:extLst>
+          </a:blip>
+          <a:stretch>
+            <a:fillRect/>
+          </a:stretch>
+        </p:blipFill>
+        <p:spPr>
+          <a:xfrm>
+            <a:off x="838200" y="1590261"/>
+            <a:ext cx="4028222" cy="4399722"/>
+          </a:xfrm>
+          <a:prstGeom prst="rect">
+            <a:avLst/>
+          </a:prstGeom>
+        </p:spPr>
+      </p:pic>
     </p:spTree>
     <p:extLst>
       <p:ext uri="{BB962C8B-B14F-4D97-AF65-F5344CB8AC3E}">
-        <p14:creationId xmlns:p14="http://schemas.microsoft.com/office/powerpoint/2010/main" val="747529155"/>
+        <p14:creationId xmlns:p14="http://schemas.microsoft.com/office/powerpoint/2010/main" val="2620836187"/>
       </p:ext>
     </p:extLst>
   </p:cSld>
@@ -3822,28 +3872,6 @@
 <file path=ppt/slides/slide4.xml><?xml version="1.0" encoding="utf-8"?>
 <p:sld xmlns:a="http://schemas.openxmlformats.org/drawingml/2006/main" xmlns:r="http://schemas.openxmlformats.org/officeDocument/2006/relationships" xmlns:p="http://schemas.openxmlformats.org/presentationml/2006/main">
   <p:cSld>
-    <p:bg>
-      <p:bgPr>
-        <a:gradFill>
-          <a:gsLst>
-            <a:gs pos="0">
-              <a:schemeClr val="tx1">
-                <a:lumMod val="50000"/>
-                <a:lumOff val="50000"/>
-              </a:schemeClr>
-            </a:gs>
-            <a:gs pos="100000">
-              <a:schemeClr val="tx1">
-                <a:lumMod val="65000"/>
-                <a:lumOff val="35000"/>
-              </a:schemeClr>
-            </a:gs>
-          </a:gsLst>
-          <a:lin ang="5400000" scaled="1"/>
-        </a:gradFill>
-        <a:effectLst/>
-      </p:bgPr>
-    </p:bg>
     <p:spTree>
       <p:nvGrpSpPr>
         <p:cNvPr id="1" name=""/>
@@ -3886,7 +3914,7 @@
                 </a:solidFill>
                 <a:latin typeface="Arial Black" panose="020B0A04020102020204" pitchFamily="34" charset="0"/>
               </a:rPr>
-              <a:t>Technology</a:t>
+              <a:t>Visuals (Mood)</a:t>
             </a:r>
             <a:endParaRPr lang="en-BE" dirty="0">
               <a:solidFill>
@@ -3897,6 +3925,609 @@
           </a:p>
         </p:txBody>
       </p:sp>
+      <p:pic>
+        <p:nvPicPr>
+          <p:cNvPr id="2050" name="Picture 2">
+            <a:extLst>
+              <a:ext uri="{FF2B5EF4-FFF2-40B4-BE49-F238E27FC236}">
+                <a16:creationId xmlns:a16="http://schemas.microsoft.com/office/drawing/2014/main" id="{F5A37D45-3EF7-7D5E-0910-A4ACA980F0CB}"/>
+              </a:ext>
+            </a:extLst>
+          </p:cNvPr>
+          <p:cNvPicPr>
+            <a:picLocks noChangeAspect="1" noChangeArrowheads="1"/>
+          </p:cNvPicPr>
+          <p:nvPr/>
+        </p:nvPicPr>
+        <p:blipFill>
+          <a:blip r:embed="rId2">
+            <a:extLst>
+              <a:ext uri="{28A0092B-C50C-407E-A947-70E740481C1C}">
+                <a14:useLocalDpi xmlns:a14="http://schemas.microsoft.com/office/drawing/2010/main" val="0"/>
+              </a:ext>
+            </a:extLst>
+          </a:blip>
+          <a:srcRect/>
+          <a:stretch>
+            <a:fillRect/>
+          </a:stretch>
+        </p:blipFill>
+        <p:spPr bwMode="auto">
+          <a:xfrm>
+            <a:off x="304305" y="1556312"/>
+            <a:ext cx="2125385" cy="4250769"/>
+          </a:xfrm>
+          <a:prstGeom prst="rect">
+            <a:avLst/>
+          </a:prstGeom>
+          <a:noFill/>
+          <a:extLst>
+            <a:ext uri="{909E8E84-426E-40DD-AFC4-6F175D3DCCD1}">
+              <a14:hiddenFill xmlns:a14="http://schemas.microsoft.com/office/drawing/2010/main">
+                <a:solidFill>
+                  <a:srgbClr val="FFFFFF"/>
+                </a:solidFill>
+              </a14:hiddenFill>
+            </a:ext>
+          </a:extLst>
+        </p:spPr>
+      </p:pic>
+      <p:pic>
+        <p:nvPicPr>
+          <p:cNvPr id="2054" name="Picture 6">
+            <a:extLst>
+              <a:ext uri="{FF2B5EF4-FFF2-40B4-BE49-F238E27FC236}">
+                <a16:creationId xmlns:a16="http://schemas.microsoft.com/office/drawing/2014/main" id="{608C7487-F727-1F97-AFE1-F81F476CFB25}"/>
+              </a:ext>
+            </a:extLst>
+          </p:cNvPr>
+          <p:cNvPicPr>
+            <a:picLocks noChangeAspect="1" noChangeArrowheads="1"/>
+          </p:cNvPicPr>
+          <p:nvPr/>
+        </p:nvPicPr>
+        <p:blipFill rotWithShape="1">
+          <a:blip r:embed="rId3">
+            <a:extLst>
+              <a:ext uri="{28A0092B-C50C-407E-A947-70E740481C1C}">
+                <a14:useLocalDpi xmlns:a14="http://schemas.microsoft.com/office/drawing/2010/main" val="0"/>
+              </a:ext>
+            </a:extLst>
+          </a:blip>
+          <a:srcRect t="2110"/>
+          <a:stretch/>
+        </p:blipFill>
+        <p:spPr bwMode="auto">
+          <a:xfrm>
+            <a:off x="2469134" y="1548893"/>
+            <a:ext cx="1888075" cy="2183088"/>
+          </a:xfrm>
+          <a:prstGeom prst="rect">
+            <a:avLst/>
+          </a:prstGeom>
+          <a:noFill/>
+          <a:extLst>
+            <a:ext uri="{909E8E84-426E-40DD-AFC4-6F175D3DCCD1}">
+              <a14:hiddenFill xmlns:a14="http://schemas.microsoft.com/office/drawing/2010/main">
+                <a:solidFill>
+                  <a:srgbClr val="FFFFFF"/>
+                </a:solidFill>
+              </a14:hiddenFill>
+            </a:ext>
+          </a:extLst>
+        </p:spPr>
+      </p:pic>
+      <p:pic>
+        <p:nvPicPr>
+          <p:cNvPr id="2056" name="Picture 8">
+            <a:extLst>
+              <a:ext uri="{FF2B5EF4-FFF2-40B4-BE49-F238E27FC236}">
+                <a16:creationId xmlns:a16="http://schemas.microsoft.com/office/drawing/2014/main" id="{ABFAC95D-FD11-812B-D703-FA21C3425B23}"/>
+              </a:ext>
+            </a:extLst>
+          </p:cNvPr>
+          <p:cNvPicPr>
+            <a:picLocks noChangeAspect="1" noChangeArrowheads="1"/>
+          </p:cNvPicPr>
+          <p:nvPr/>
+        </p:nvPicPr>
+        <p:blipFill rotWithShape="1">
+          <a:blip r:embed="rId4">
+            <a:extLst>
+              <a:ext uri="{28A0092B-C50C-407E-A947-70E740481C1C}">
+                <a14:useLocalDpi xmlns:a14="http://schemas.microsoft.com/office/drawing/2010/main" val="0"/>
+              </a:ext>
+            </a:extLst>
+          </a:blip>
+          <a:srcRect b="22500"/>
+          <a:stretch/>
+        </p:blipFill>
+        <p:spPr bwMode="auto">
+          <a:xfrm>
+            <a:off x="2463886" y="3773768"/>
+            <a:ext cx="1887690" cy="2033313"/>
+          </a:xfrm>
+          <a:prstGeom prst="rect">
+            <a:avLst/>
+          </a:prstGeom>
+          <a:noFill/>
+          <a:extLst>
+            <a:ext uri="{909E8E84-426E-40DD-AFC4-6F175D3DCCD1}">
+              <a14:hiddenFill xmlns:a14="http://schemas.microsoft.com/office/drawing/2010/main">
+                <a:solidFill>
+                  <a:srgbClr val="FFFFFF"/>
+                </a:solidFill>
+              </a14:hiddenFill>
+            </a:ext>
+          </a:extLst>
+        </p:spPr>
+      </p:pic>
+      <p:pic>
+        <p:nvPicPr>
+          <p:cNvPr id="2058" name="Picture 10">
+            <a:extLst>
+              <a:ext uri="{FF2B5EF4-FFF2-40B4-BE49-F238E27FC236}">
+                <a16:creationId xmlns:a16="http://schemas.microsoft.com/office/drawing/2014/main" id="{D0555D99-BC16-E695-3419-45BAFD81E946}"/>
+              </a:ext>
+            </a:extLst>
+          </p:cNvPr>
+          <p:cNvPicPr>
+            <a:picLocks noChangeAspect="1" noChangeArrowheads="1"/>
+          </p:cNvPicPr>
+          <p:nvPr/>
+        </p:nvPicPr>
+        <p:blipFill rotWithShape="1">
+          <a:blip r:embed="rId5">
+            <a:extLst>
+              <a:ext uri="{28A0092B-C50C-407E-A947-70E740481C1C}">
+                <a14:useLocalDpi xmlns:a14="http://schemas.microsoft.com/office/drawing/2010/main" val="0"/>
+              </a:ext>
+            </a:extLst>
+          </a:blip>
+          <a:srcRect l="7175" r="4162" b="6861"/>
+          <a:stretch/>
+        </p:blipFill>
+        <p:spPr bwMode="auto">
+          <a:xfrm>
+            <a:off x="4396653" y="1548893"/>
+            <a:ext cx="2630556" cy="2033313"/>
+          </a:xfrm>
+          <a:prstGeom prst="rect">
+            <a:avLst/>
+          </a:prstGeom>
+          <a:noFill/>
+          <a:extLst>
+            <a:ext uri="{909E8E84-426E-40DD-AFC4-6F175D3DCCD1}">
+              <a14:hiddenFill xmlns:a14="http://schemas.microsoft.com/office/drawing/2010/main">
+                <a:solidFill>
+                  <a:srgbClr val="FFFFFF"/>
+                </a:solidFill>
+              </a14:hiddenFill>
+            </a:ext>
+          </a:extLst>
+        </p:spPr>
+      </p:pic>
+      <p:pic>
+        <p:nvPicPr>
+          <p:cNvPr id="2060" name="Picture 12">
+            <a:extLst>
+              <a:ext uri="{FF2B5EF4-FFF2-40B4-BE49-F238E27FC236}">
+                <a16:creationId xmlns:a16="http://schemas.microsoft.com/office/drawing/2014/main" id="{192D4D7C-272D-3A2C-08E3-1EDC883CCA63}"/>
+              </a:ext>
+            </a:extLst>
+          </p:cNvPr>
+          <p:cNvPicPr>
+            <a:picLocks noChangeAspect="1" noChangeArrowheads="1"/>
+          </p:cNvPicPr>
+          <p:nvPr/>
+        </p:nvPicPr>
+        <p:blipFill rotWithShape="1">
+          <a:blip r:embed="rId6">
+            <a:extLst>
+              <a:ext uri="{28A0092B-C50C-407E-A947-70E740481C1C}">
+                <a14:useLocalDpi xmlns:a14="http://schemas.microsoft.com/office/drawing/2010/main" val="0"/>
+              </a:ext>
+            </a:extLst>
+          </a:blip>
+          <a:srcRect l="2937" t="2818" r="13846" b="35973"/>
+          <a:stretch/>
+        </p:blipFill>
+        <p:spPr bwMode="auto">
+          <a:xfrm>
+            <a:off x="7072286" y="1556312"/>
+            <a:ext cx="2184432" cy="2165421"/>
+          </a:xfrm>
+          <a:prstGeom prst="rect">
+            <a:avLst/>
+          </a:prstGeom>
+          <a:noFill/>
+          <a:extLst>
+            <a:ext uri="{909E8E84-426E-40DD-AFC4-6F175D3DCCD1}">
+              <a14:hiddenFill xmlns:a14="http://schemas.microsoft.com/office/drawing/2010/main">
+                <a:solidFill>
+                  <a:srgbClr val="FFFFFF"/>
+                </a:solidFill>
+              </a14:hiddenFill>
+            </a:ext>
+          </a:extLst>
+        </p:spPr>
+      </p:pic>
+      <p:pic>
+        <p:nvPicPr>
+          <p:cNvPr id="2062" name="Picture 14">
+            <a:extLst>
+              <a:ext uri="{FF2B5EF4-FFF2-40B4-BE49-F238E27FC236}">
+                <a16:creationId xmlns:a16="http://schemas.microsoft.com/office/drawing/2014/main" id="{D5CC3E6F-9901-E1B6-FA79-7CBAF3473C92}"/>
+              </a:ext>
+            </a:extLst>
+          </p:cNvPr>
+          <p:cNvPicPr>
+            <a:picLocks noChangeAspect="1" noChangeArrowheads="1"/>
+          </p:cNvPicPr>
+          <p:nvPr/>
+        </p:nvPicPr>
+        <p:blipFill rotWithShape="1">
+          <a:blip r:embed="rId7">
+            <a:extLst>
+              <a:ext uri="{28A0092B-C50C-407E-A947-70E740481C1C}">
+                <a14:useLocalDpi xmlns:a14="http://schemas.microsoft.com/office/drawing/2010/main" val="0"/>
+              </a:ext>
+            </a:extLst>
+          </a:blip>
+          <a:srcRect t="2221" b="7343"/>
+          <a:stretch/>
+        </p:blipFill>
+        <p:spPr bwMode="auto">
+          <a:xfrm>
+            <a:off x="9301795" y="1556312"/>
+            <a:ext cx="2530824" cy="3441482"/>
+          </a:xfrm>
+          <a:prstGeom prst="rect">
+            <a:avLst/>
+          </a:prstGeom>
+          <a:noFill/>
+          <a:extLst>
+            <a:ext uri="{909E8E84-426E-40DD-AFC4-6F175D3DCCD1}">
+              <a14:hiddenFill xmlns:a14="http://schemas.microsoft.com/office/drawing/2010/main">
+                <a:solidFill>
+                  <a:srgbClr val="FFFFFF"/>
+                </a:solidFill>
+              </a14:hiddenFill>
+            </a:ext>
+          </a:extLst>
+        </p:spPr>
+      </p:pic>
+      <p:pic>
+        <p:nvPicPr>
+          <p:cNvPr id="2064" name="Picture 16">
+            <a:extLst>
+              <a:ext uri="{FF2B5EF4-FFF2-40B4-BE49-F238E27FC236}">
+                <a16:creationId xmlns:a16="http://schemas.microsoft.com/office/drawing/2014/main" id="{90336A8B-4DED-65DD-C96A-96C06DD5F9EA}"/>
+              </a:ext>
+            </a:extLst>
+          </p:cNvPr>
+          <p:cNvPicPr>
+            <a:picLocks noChangeAspect="1" noChangeArrowheads="1"/>
+          </p:cNvPicPr>
+          <p:nvPr/>
+        </p:nvPicPr>
+        <p:blipFill>
+          <a:blip r:embed="rId8">
+            <a:extLst>
+              <a:ext uri="{28A0092B-C50C-407E-A947-70E740481C1C}">
+                <a14:useLocalDpi xmlns:a14="http://schemas.microsoft.com/office/drawing/2010/main" val="0"/>
+              </a:ext>
+            </a:extLst>
+          </a:blip>
+          <a:srcRect/>
+          <a:stretch>
+            <a:fillRect/>
+          </a:stretch>
+        </p:blipFill>
+        <p:spPr bwMode="auto">
+          <a:xfrm>
+            <a:off x="4396653" y="3641659"/>
+            <a:ext cx="2630556" cy="2165422"/>
+          </a:xfrm>
+          <a:prstGeom prst="rect">
+            <a:avLst/>
+          </a:prstGeom>
+          <a:noFill/>
+          <a:extLst>
+            <a:ext uri="{909E8E84-426E-40DD-AFC4-6F175D3DCCD1}">
+              <a14:hiddenFill xmlns:a14="http://schemas.microsoft.com/office/drawing/2010/main">
+                <a:solidFill>
+                  <a:srgbClr val="FFFFFF"/>
+                </a:solidFill>
+              </a14:hiddenFill>
+            </a:ext>
+          </a:extLst>
+        </p:spPr>
+      </p:pic>
+      <p:pic>
+        <p:nvPicPr>
+          <p:cNvPr id="2066" name="Picture 18">
+            <a:extLst>
+              <a:ext uri="{FF2B5EF4-FFF2-40B4-BE49-F238E27FC236}">
+                <a16:creationId xmlns:a16="http://schemas.microsoft.com/office/drawing/2014/main" id="{58B5FB6A-C04A-01FF-F613-5C1F9613405F}"/>
+              </a:ext>
+            </a:extLst>
+          </p:cNvPr>
+          <p:cNvPicPr>
+            <a:picLocks noChangeAspect="1" noChangeArrowheads="1"/>
+          </p:cNvPicPr>
+          <p:nvPr/>
+        </p:nvPicPr>
+        <p:blipFill>
+          <a:blip r:embed="rId9">
+            <a:extLst>
+              <a:ext uri="{28A0092B-C50C-407E-A947-70E740481C1C}">
+                <a14:useLocalDpi xmlns:a14="http://schemas.microsoft.com/office/drawing/2010/main" val="0"/>
+              </a:ext>
+            </a:extLst>
+          </a:blip>
+          <a:srcRect/>
+          <a:stretch>
+            <a:fillRect/>
+          </a:stretch>
+        </p:blipFill>
+        <p:spPr bwMode="auto">
+          <a:xfrm>
+            <a:off x="7072286" y="3773768"/>
+            <a:ext cx="2184432" cy="2021762"/>
+          </a:xfrm>
+          <a:prstGeom prst="rect">
+            <a:avLst/>
+          </a:prstGeom>
+          <a:noFill/>
+          <a:extLst>
+            <a:ext uri="{909E8E84-426E-40DD-AFC4-6F175D3DCCD1}">
+              <a14:hiddenFill xmlns:a14="http://schemas.microsoft.com/office/drawing/2010/main">
+                <a:solidFill>
+                  <a:srgbClr val="FFFFFF"/>
+                </a:solidFill>
+              </a14:hiddenFill>
+            </a:ext>
+          </a:extLst>
+        </p:spPr>
+      </p:pic>
+    </p:spTree>
+    <p:extLst>
+      <p:ext uri="{BB962C8B-B14F-4D97-AF65-F5344CB8AC3E}">
+        <p14:creationId xmlns:p14="http://schemas.microsoft.com/office/powerpoint/2010/main" val="747529155"/>
+      </p:ext>
+    </p:extLst>
+  </p:cSld>
+  <p:clrMapOvr>
+    <a:masterClrMapping/>
+  </p:clrMapOvr>
+</p:sld>
+</file>
+
+<file path=ppt/slides/slide5.xml><?xml version="1.0" encoding="utf-8"?>
+<p:sld xmlns:a="http://schemas.openxmlformats.org/drawingml/2006/main" xmlns:r="http://schemas.openxmlformats.org/officeDocument/2006/relationships" xmlns:p="http://schemas.openxmlformats.org/presentationml/2006/main">
+  <p:cSld>
+    <p:spTree>
+      <p:nvGrpSpPr>
+        <p:cNvPr id="1" name=""/>
+        <p:cNvGrpSpPr/>
+        <p:nvPr/>
+      </p:nvGrpSpPr>
+      <p:grpSpPr>
+        <a:xfrm>
+          <a:off x="0" y="0"/>
+          <a:ext cx="0" cy="0"/>
+          <a:chOff x="0" y="0"/>
+          <a:chExt cx="0" cy="0"/>
+        </a:xfrm>
+      </p:grpSpPr>
+      <p:sp>
+        <p:nvSpPr>
+          <p:cNvPr id="2" name="Title 1">
+            <a:extLst>
+              <a:ext uri="{FF2B5EF4-FFF2-40B4-BE49-F238E27FC236}">
+                <a16:creationId xmlns:a16="http://schemas.microsoft.com/office/drawing/2014/main" id="{2E2E0D04-FA00-5399-A228-CC6827AE0832}"/>
+              </a:ext>
+            </a:extLst>
+          </p:cNvPr>
+          <p:cNvSpPr>
+            <a:spLocks noGrp="1"/>
+          </p:cNvSpPr>
+          <p:nvPr>
+            <p:ph type="title"/>
+          </p:nvPr>
+        </p:nvSpPr>
+        <p:spPr/>
+        <p:txBody>
+          <a:bodyPr/>
+          <a:lstStyle/>
+          <a:p>
+            <a:r>
+              <a:rPr lang="en-GB" dirty="0">
+                <a:solidFill>
+                  <a:schemeClr val="bg1"/>
+                </a:solidFill>
+                <a:latin typeface="Arial Black" panose="020B0A04020102020204" pitchFamily="34" charset="0"/>
+              </a:rPr>
+              <a:t>Visuals (Style)</a:t>
+            </a:r>
+            <a:endParaRPr lang="en-BE" dirty="0">
+              <a:solidFill>
+                <a:schemeClr val="bg1"/>
+              </a:solidFill>
+              <a:latin typeface="Arial Black" panose="020B0A04020102020204" pitchFamily="34" charset="0"/>
+            </a:endParaRPr>
+          </a:p>
+        </p:txBody>
+      </p:sp>
+      <p:sp>
+        <p:nvSpPr>
+          <p:cNvPr id="14" name="Rectangle 1">
+            <a:extLst>
+              <a:ext uri="{FF2B5EF4-FFF2-40B4-BE49-F238E27FC236}">
+                <a16:creationId xmlns:a16="http://schemas.microsoft.com/office/drawing/2014/main" id="{212709A9-7111-08A9-ABE9-126B10E66779}"/>
+              </a:ext>
+            </a:extLst>
+          </p:cNvPr>
+          <p:cNvSpPr>
+            <a:spLocks noChangeArrowheads="1"/>
+          </p:cNvSpPr>
+          <p:nvPr/>
+        </p:nvSpPr>
+        <p:spPr bwMode="auto">
+          <a:xfrm>
+            <a:off x="0" y="0"/>
+            <a:ext cx="12192000" cy="0"/>
+          </a:xfrm>
+          <a:prstGeom prst="rect">
+            <a:avLst/>
+          </a:prstGeom>
+          <a:noFill/>
+          <a:ln>
+            <a:noFill/>
+          </a:ln>
+          <a:effectLst/>
+          <a:extLst>
+            <a:ext uri="{909E8E84-426E-40DD-AFC4-6F175D3DCCD1}">
+              <a14:hiddenFill xmlns:a14="http://schemas.microsoft.com/office/drawing/2010/main">
+                <a:solidFill>
+                  <a:schemeClr val="accent1"/>
+                </a:solidFill>
+              </a14:hiddenFill>
+            </a:ext>
+            <a:ext uri="{91240B29-F687-4F45-9708-019B960494DF}">
+              <a14:hiddenLine xmlns:a14="http://schemas.microsoft.com/office/drawing/2010/main" w="9525">
+                <a:solidFill>
+                  <a:schemeClr val="tx1"/>
+                </a:solidFill>
+                <a:miter lim="800000"/>
+                <a:headEnd/>
+                <a:tailEnd/>
+              </a14:hiddenLine>
+            </a:ext>
+            <a:ext uri="{AF507438-7753-43E0-B8FC-AC1667EBCBE1}">
+              <a14:hiddenEffects xmlns:a14="http://schemas.microsoft.com/office/drawing/2010/main">
+                <a:effectLst>
+                  <a:outerShdw dist="35921" dir="2700000" algn="ctr" rotWithShape="0">
+                    <a:schemeClr val="bg2"/>
+                  </a:outerShdw>
+                </a:effectLst>
+              </a14:hiddenEffects>
+            </a:ext>
+          </a:extLst>
+        </p:spPr>
+        <p:txBody>
+          <a:bodyPr vert="horz" wrap="none" lIns="91440" tIns="45720" rIns="91440" bIns="45720" numCol="1" anchor="ctr" anchorCtr="0" compatLnSpc="1">
+            <a:prstTxWarp prst="textNoShape">
+              <a:avLst/>
+            </a:prstTxWarp>
+            <a:spAutoFit/>
+          </a:bodyPr>
+          <a:lstStyle/>
+          <a:p>
+            <a:endParaRPr lang="en-BE"/>
+          </a:p>
+        </p:txBody>
+      </p:sp>
+      <p:pic>
+        <p:nvPicPr>
+          <p:cNvPr id="24" name="Picture 23">
+            <a:extLst>
+              <a:ext uri="{FF2B5EF4-FFF2-40B4-BE49-F238E27FC236}">
+                <a16:creationId xmlns:a16="http://schemas.microsoft.com/office/drawing/2014/main" id="{70EB1AE6-72FA-E983-8010-3849BAFF0DD8}"/>
+              </a:ext>
+            </a:extLst>
+          </p:cNvPr>
+          <p:cNvPicPr>
+            <a:picLocks noChangeAspect="1"/>
+          </p:cNvPicPr>
+          <p:nvPr/>
+        </p:nvPicPr>
+        <p:blipFill>
+          <a:blip r:embed="rId2"/>
+          <a:stretch>
+            <a:fillRect/>
+          </a:stretch>
+        </p:blipFill>
+        <p:spPr>
+          <a:xfrm>
+            <a:off x="357187" y="1552913"/>
+            <a:ext cx="11477625" cy="4957792"/>
+          </a:xfrm>
+          <a:prstGeom prst="rect">
+            <a:avLst/>
+          </a:prstGeom>
+        </p:spPr>
+      </p:pic>
+    </p:spTree>
+    <p:extLst>
+      <p:ext uri="{BB962C8B-B14F-4D97-AF65-F5344CB8AC3E}">
+        <p14:creationId xmlns:p14="http://schemas.microsoft.com/office/powerpoint/2010/main" val="3671992518"/>
+      </p:ext>
+    </p:extLst>
+  </p:cSld>
+  <p:clrMapOvr>
+    <a:masterClrMapping/>
+  </p:clrMapOvr>
+</p:sld>
+</file>
+
+<file path=ppt/slides/slide6.xml><?xml version="1.0" encoding="utf-8"?>
+<p:sld xmlns:a="http://schemas.openxmlformats.org/drawingml/2006/main" xmlns:r="http://schemas.openxmlformats.org/officeDocument/2006/relationships" xmlns:p="http://schemas.openxmlformats.org/presentationml/2006/main">
+  <p:cSld>
+    <p:spTree>
+      <p:nvGrpSpPr>
+        <p:cNvPr id="1" name=""/>
+        <p:cNvGrpSpPr/>
+        <p:nvPr/>
+      </p:nvGrpSpPr>
+      <p:grpSpPr>
+        <a:xfrm>
+          <a:off x="0" y="0"/>
+          <a:ext cx="0" cy="0"/>
+          <a:chOff x="0" y="0"/>
+          <a:chExt cx="0" cy="0"/>
+        </a:xfrm>
+      </p:grpSpPr>
+      <p:sp>
+        <p:nvSpPr>
+          <p:cNvPr id="2" name="Title 1">
+            <a:extLst>
+              <a:ext uri="{FF2B5EF4-FFF2-40B4-BE49-F238E27FC236}">
+                <a16:creationId xmlns:a16="http://schemas.microsoft.com/office/drawing/2014/main" id="{2E2E0D04-FA00-5399-A228-CC6827AE0832}"/>
+              </a:ext>
+            </a:extLst>
+          </p:cNvPr>
+          <p:cNvSpPr>
+            <a:spLocks noGrp="1"/>
+          </p:cNvSpPr>
+          <p:nvPr>
+            <p:ph type="title"/>
+          </p:nvPr>
+        </p:nvSpPr>
+        <p:spPr/>
+        <p:txBody>
+          <a:bodyPr/>
+          <a:lstStyle/>
+          <a:p>
+            <a:r>
+              <a:rPr lang="en-GB" dirty="0">
+                <a:solidFill>
+                  <a:schemeClr val="bg1"/>
+                </a:solidFill>
+                <a:latin typeface="Arial Black" panose="020B0A04020102020204" pitchFamily="34" charset="0"/>
+              </a:rPr>
+              <a:t>Goals</a:t>
+            </a:r>
+            <a:endParaRPr lang="en-BE" dirty="0">
+              <a:solidFill>
+                <a:schemeClr val="bg1"/>
+              </a:solidFill>
+              <a:latin typeface="Arial Black" panose="020B0A04020102020204" pitchFamily="34" charset="0"/>
+            </a:endParaRPr>
+          </a:p>
+        </p:txBody>
+      </p:sp>
       <p:sp>
         <p:nvSpPr>
           <p:cNvPr id="3" name="Subtitle 2">
@@ -3918,6 +4549,11 @@
           <a:bodyPr/>
           <a:lstStyle/>
           <a:p>
+            <a:pPr>
+              <a:lnSpc>
+                <a:spcPct val="150000"/>
+              </a:lnSpc>
+            </a:pPr>
             <a:r>
               <a:rPr lang="en-GB" dirty="0">
                 <a:solidFill>
@@ -3928,11 +4564,15 @@
                 <a:latin typeface="Arial" panose="020B0604020202020204" pitchFamily="34" charset="0"/>
                 <a:cs typeface="Arial" panose="020B0604020202020204" pitchFamily="34" charset="0"/>
               </a:rPr>
-              <a:t>Engine</a:t>
-            </a:r>
-          </a:p>
-          <a:p>
-            <a:pPr lvl="1"/>
+              <a:t>Learn UE 5.4</a:t>
+            </a:r>
+          </a:p>
+          <a:p>
+            <a:pPr>
+              <a:lnSpc>
+                <a:spcPct val="150000"/>
+              </a:lnSpc>
+            </a:pPr>
             <a:r>
               <a:rPr lang="en-GB" dirty="0">
                 <a:solidFill>
@@ -3943,15 +4583,163 @@
                 <a:latin typeface="Arial" panose="020B0604020202020204" pitchFamily="34" charset="0"/>
                 <a:cs typeface="Arial" panose="020B0604020202020204" pitchFamily="34" charset="0"/>
               </a:rPr>
-              <a:t>Unreal Engine 5</a:t>
-            </a:r>
-          </a:p>
-        </p:txBody>
-      </p:sp>
+              <a:t>Game we wanted</a:t>
+            </a:r>
+          </a:p>
+          <a:p>
+            <a:pPr>
+              <a:lnSpc>
+                <a:spcPct val="150000"/>
+              </a:lnSpc>
+            </a:pPr>
+            <a:r>
+              <a:rPr lang="en-GB" dirty="0">
+                <a:solidFill>
+                  <a:schemeClr val="bg2">
+                    <a:lumMod val="90000"/>
+                  </a:schemeClr>
+                </a:solidFill>
+                <a:latin typeface="Arial" panose="020B0604020202020204" pitchFamily="34" charset="0"/>
+                <a:cs typeface="Arial" panose="020B0604020202020204" pitchFamily="34" charset="0"/>
+              </a:rPr>
+              <a:t>Store release</a:t>
+            </a:r>
+          </a:p>
+          <a:p>
+            <a:pPr>
+              <a:lnSpc>
+                <a:spcPct val="150000"/>
+              </a:lnSpc>
+            </a:pPr>
+            <a:r>
+              <a:rPr lang="en-GB" dirty="0">
+                <a:solidFill>
+                  <a:schemeClr val="bg2">
+                    <a:lumMod val="90000"/>
+                  </a:schemeClr>
+                </a:solidFill>
+                <a:latin typeface="Arial" panose="020B0604020202020204" pitchFamily="34" charset="0"/>
+                <a:cs typeface="Arial" panose="020B0604020202020204" pitchFamily="34" charset="0"/>
+              </a:rPr>
+              <a:t>Contests</a:t>
+            </a:r>
+          </a:p>
+          <a:p>
+            <a:pPr>
+              <a:lnSpc>
+                <a:spcPct val="150000"/>
+              </a:lnSpc>
+            </a:pPr>
+            <a:endParaRPr lang="en-GB" dirty="0">
+              <a:solidFill>
+                <a:schemeClr val="bg2">
+                  <a:lumMod val="90000"/>
+                </a:schemeClr>
+              </a:solidFill>
+              <a:latin typeface="Arial" panose="020B0604020202020204" pitchFamily="34" charset="0"/>
+              <a:cs typeface="Arial" panose="020B0604020202020204" pitchFamily="34" charset="0"/>
+            </a:endParaRPr>
+          </a:p>
+        </p:txBody>
+      </p:sp>
+      <p:pic>
+        <p:nvPicPr>
+          <p:cNvPr id="4098" name="Picture 2" descr="The Game Development World Championship has announced 2022's finalists -  MCV/DEVELOP">
+            <a:extLst>
+              <a:ext uri="{FF2B5EF4-FFF2-40B4-BE49-F238E27FC236}">
+                <a16:creationId xmlns:a16="http://schemas.microsoft.com/office/drawing/2014/main" id="{2CE4205C-9EB8-F18A-173F-FCED55DA0374}"/>
+              </a:ext>
+            </a:extLst>
+          </p:cNvPr>
+          <p:cNvPicPr>
+            <a:picLocks noChangeAspect="1" noChangeArrowheads="1"/>
+          </p:cNvPicPr>
+          <p:nvPr/>
+        </p:nvPicPr>
+        <p:blipFill>
+          <a:blip r:embed="rId2">
+            <a:extLst>
+              <a:ext uri="{28A0092B-C50C-407E-A947-70E740481C1C}">
+                <a14:useLocalDpi xmlns:a14="http://schemas.microsoft.com/office/drawing/2010/main" val="0"/>
+              </a:ext>
+            </a:extLst>
+          </a:blip>
+          <a:srcRect/>
+          <a:stretch>
+            <a:fillRect/>
+          </a:stretch>
+        </p:blipFill>
+        <p:spPr bwMode="auto">
+          <a:xfrm>
+            <a:off x="838200" y="4908549"/>
+            <a:ext cx="2368550" cy="1184275"/>
+          </a:xfrm>
+          <a:prstGeom prst="rect">
+            <a:avLst/>
+          </a:prstGeom>
+          <a:noFill/>
+          <a:extLst>
+            <a:ext uri="{909E8E84-426E-40DD-AFC4-6F175D3DCCD1}">
+              <a14:hiddenFill xmlns:a14="http://schemas.microsoft.com/office/drawing/2010/main">
+                <a:solidFill>
+                  <a:srgbClr val="FFFFFF"/>
+                </a:solidFill>
+              </a14:hiddenFill>
+            </a:ext>
+          </a:extLst>
+        </p:spPr>
+      </p:pic>
+      <p:pic>
+        <p:nvPicPr>
+          <p:cNvPr id="4100" name="Picture 4" descr="Belgian Game Awards">
+            <a:extLst>
+              <a:ext uri="{FF2B5EF4-FFF2-40B4-BE49-F238E27FC236}">
+                <a16:creationId xmlns:a16="http://schemas.microsoft.com/office/drawing/2014/main" id="{054C460F-FBA8-CB2A-1E73-84DB6FB4AC2B}"/>
+              </a:ext>
+            </a:extLst>
+          </p:cNvPr>
+          <p:cNvPicPr>
+            <a:picLocks noChangeAspect="1" noChangeArrowheads="1"/>
+          </p:cNvPicPr>
+          <p:nvPr/>
+        </p:nvPicPr>
+        <p:blipFill>
+          <a:blip r:embed="rId3">
+            <a:extLst>
+              <a:ext uri="{28A0092B-C50C-407E-A947-70E740481C1C}">
+                <a14:useLocalDpi xmlns:a14="http://schemas.microsoft.com/office/drawing/2010/main" val="0"/>
+              </a:ext>
+            </a:extLst>
+          </a:blip>
+          <a:srcRect/>
+          <a:stretch>
+            <a:fillRect/>
+          </a:stretch>
+        </p:blipFill>
+        <p:spPr bwMode="auto">
+          <a:xfrm>
+            <a:off x="3309939" y="4451342"/>
+            <a:ext cx="1528762" cy="1641482"/>
+          </a:xfrm>
+          <a:prstGeom prst="rect">
+            <a:avLst/>
+          </a:prstGeom>
+          <a:noFill/>
+          <a:extLst>
+            <a:ext uri="{909E8E84-426E-40DD-AFC4-6F175D3DCCD1}">
+              <a14:hiddenFill xmlns:a14="http://schemas.microsoft.com/office/drawing/2010/main">
+                <a:solidFill>
+                  <a:srgbClr val="FFFFFF"/>
+                </a:solidFill>
+              </a14:hiddenFill>
+            </a:ext>
+          </a:extLst>
+        </p:spPr>
+      </p:pic>
     </p:spTree>
     <p:extLst>
       <p:ext uri="{BB962C8B-B14F-4D97-AF65-F5344CB8AC3E}">
-        <p14:creationId xmlns:p14="http://schemas.microsoft.com/office/powerpoint/2010/main" val="2633509943"/>
+        <p14:creationId xmlns:p14="http://schemas.microsoft.com/office/powerpoint/2010/main" val="652777051"/>
       </p:ext>
     </p:extLst>
   </p:cSld>

</xml_diff>